<commit_message>
Replaced title_slide_template.pptx with replacement that has an updated URL
</commit_message>
<xml_diff>
--- a/docs/modules/title_slide_template.pptx
+++ b/docs/modules/title_slide_template.pptx
@@ -224,7 +224,7 @@
             <a:fld id="{069DA124-AF56-454E-9830-C40BDE9DFF4B}" type="datetimeFigureOut">
               <a:rPr lang="en-US" smtClean="0"/>
               <a:pPr/>
-              <a:t>9/3/20</a:t>
+              <a:t>9/9/20</a:t>
             </a:fld>
             <a:endParaRPr lang="en-US"/>
           </a:p>
@@ -391,7 +391,7 @@
             <a:fld id="{D84D92EA-C28B-4061-A385-B393EF958A7B}" type="datetimeFigureOut">
               <a:rPr lang="en-US" smtClean="0"/>
               <a:pPr/>
-              <a:t>9/3/20</a:t>
+              <a:t>9/9/20</a:t>
             </a:fld>
             <a:endParaRPr lang="en-US"/>
           </a:p>
@@ -4101,7 +4101,7 @@
             </a:r>
             <a:r>
               <a:rPr lang="en-US" sz="3200" dirty="0"/>
-              <a:t>/community-codes/</a:t>
+              <a:t>/community-code/</a:t>
             </a:r>
             <a:r>
               <a:rPr lang="en-US" sz="3200" dirty="0" err="1"/>

</xml_diff>